<commit_message>
Rascunho inicial do meu blog
</commit_message>
<xml_diff>
--- a/Projeto_HTML.pptx
+++ b/Projeto_HTML.pptx
@@ -7,6 +7,7 @@
   <p:sldIdLst>
     <p:sldId id="256" r:id="rId2"/>
     <p:sldId id="257" r:id="rId3"/>
+    <p:sldId id="258" r:id="rId4"/>
   </p:sldIdLst>
   <p:sldSz cx="9144000" cy="6858000" type="screen4x3"/>
   <p:notesSz cx="6858000" cy="9144000"/>
@@ -3657,7 +3658,11 @@
           <a:bodyPr/>
           <a:lstStyle/>
           <a:p>
-            <a:endParaRPr lang="pt-BR"/>
+            <a:r>
+              <a:rPr lang="pt-BR" dirty="0" smtClean="0"/>
+              <a:t>objetivo</a:t>
+            </a:r>
+            <a:endParaRPr lang="pt-BR" dirty="0"/>
           </a:p>
         </p:txBody>
       </p:sp>
@@ -3676,7 +3681,1287 @@
           <a:bodyPr/>
           <a:lstStyle/>
           <a:p>
+            <a:r>
+              <a:rPr lang="pt-BR" dirty="0" smtClean="0"/>
+              <a:t>Gostaria de criar um blog pessoal onde eu possa listar as diferentes facetas da minha vida</a:t>
+            </a:r>
+          </a:p>
+          <a:p>
+            <a:pPr lvl="1"/>
+            <a:r>
+              <a:rPr lang="pt-BR" dirty="0" smtClean="0"/>
+              <a:t>Família</a:t>
+            </a:r>
+          </a:p>
+          <a:p>
+            <a:pPr lvl="1"/>
+            <a:r>
+              <a:rPr lang="pt-BR" dirty="0" smtClean="0"/>
+              <a:t>Estudos</a:t>
+            </a:r>
+          </a:p>
+          <a:p>
+            <a:pPr lvl="1"/>
+            <a:r>
+              <a:rPr lang="pt-BR" dirty="0" smtClean="0"/>
+              <a:t>Experiência Laboral</a:t>
+            </a:r>
+          </a:p>
+          <a:p>
+            <a:pPr lvl="1"/>
+            <a:r>
+              <a:rPr lang="pt-BR" dirty="0" smtClean="0"/>
+              <a:t>Igreja</a:t>
+            </a:r>
+          </a:p>
+          <a:p>
+            <a:pPr lvl="1"/>
+            <a:r>
+              <a:rPr lang="pt-BR" dirty="0" smtClean="0"/>
+              <a:t>Viagens </a:t>
+            </a:r>
+          </a:p>
+          <a:p>
+            <a:pPr lvl="1"/>
+            <a:r>
+              <a:rPr lang="pt-BR" dirty="0" smtClean="0"/>
+              <a:t>Hobbies</a:t>
+            </a:r>
+          </a:p>
+        </p:txBody>
+      </p:sp>
+    </p:spTree>
+  </p:cSld>
+  <p:clrMapOvr>
+    <a:masterClrMapping/>
+  </p:clrMapOvr>
+</p:sld>
+</file>
+
+<file path=ppt/slides/slide3.xml><?xml version="1.0" encoding="utf-8"?>
+<p:sld xmlns:a="http://schemas.openxmlformats.org/drawingml/2006/main" xmlns:r="http://schemas.openxmlformats.org/officeDocument/2006/relationships" xmlns:p="http://schemas.openxmlformats.org/presentationml/2006/main">
+  <p:cSld>
+    <p:spTree>
+      <p:nvGrpSpPr>
+        <p:cNvPr id="1" name=""/>
+        <p:cNvGrpSpPr/>
+        <p:nvPr/>
+      </p:nvGrpSpPr>
+      <p:grpSpPr>
+        <a:xfrm>
+          <a:off x="0" y="0"/>
+          <a:ext cx="0" cy="0"/>
+          <a:chOff x="0" y="0"/>
+          <a:chExt cx="0" cy="0"/>
+        </a:xfrm>
+      </p:grpSpPr>
+      <p:sp>
+        <p:nvSpPr>
+          <p:cNvPr id="2" name="Título 1"/>
+          <p:cNvSpPr>
+            <a:spLocks noGrp="1"/>
+          </p:cNvSpPr>
+          <p:nvPr>
+            <p:ph type="title"/>
+          </p:nvPr>
+        </p:nvSpPr>
+        <p:spPr/>
+        <p:txBody>
+          <a:bodyPr/>
+          <a:lstStyle/>
+          <a:p>
+            <a:r>
+              <a:rPr lang="pt-BR" dirty="0" smtClean="0"/>
+              <a:t>Rascunho</a:t>
+            </a:r>
+            <a:endParaRPr lang="pt-BR" dirty="0"/>
+          </a:p>
+        </p:txBody>
+      </p:sp>
+      <p:sp>
+        <p:nvSpPr>
+          <p:cNvPr id="3" name="Espaço Reservado para Conteúdo 2"/>
+          <p:cNvSpPr>
+            <a:spLocks noGrp="1"/>
+          </p:cNvSpPr>
+          <p:nvPr>
+            <p:ph idx="1"/>
+          </p:nvPr>
+        </p:nvSpPr>
+        <p:spPr>
+          <a:ln/>
+        </p:spPr>
+        <p:style>
+          <a:lnRef idx="2">
+            <a:schemeClr val="accent1"/>
+          </a:lnRef>
+          <a:fillRef idx="1">
+            <a:schemeClr val="lt1"/>
+          </a:fillRef>
+          <a:effectRef idx="0">
+            <a:schemeClr val="accent1"/>
+          </a:effectRef>
+          <a:fontRef idx="minor">
+            <a:schemeClr val="dk1"/>
+          </a:fontRef>
+        </p:style>
+        <p:txBody>
+          <a:bodyPr/>
+          <a:lstStyle/>
+          <a:p>
+            <a:pPr>
+              <a:buNone/>
+            </a:pPr>
+            <a:endParaRPr lang="pt-BR" dirty="0"/>
+          </a:p>
+        </p:txBody>
+      </p:sp>
+      <p:sp>
+        <p:nvSpPr>
+          <p:cNvPr id="4" name="Retângulo 3"/>
+          <p:cNvSpPr/>
+          <p:nvPr/>
+        </p:nvSpPr>
+        <p:spPr>
+          <a:xfrm>
+            <a:off x="428596" y="1643050"/>
+            <a:ext cx="7286676" cy="857256"/>
+          </a:xfrm>
+          <a:prstGeom prst="rect">
+            <a:avLst/>
+          </a:prstGeom>
+        </p:spPr>
+        <p:style>
+          <a:lnRef idx="2">
+            <a:schemeClr val="accent1">
+              <a:shade val="50000"/>
+            </a:schemeClr>
+          </a:lnRef>
+          <a:fillRef idx="1">
+            <a:schemeClr val="accent1"/>
+          </a:fillRef>
+          <a:effectRef idx="0">
+            <a:schemeClr val="accent1"/>
+          </a:effectRef>
+          <a:fontRef idx="minor">
+            <a:schemeClr val="lt1"/>
+          </a:fontRef>
+        </p:style>
+        <p:txBody>
+          <a:bodyPr rtlCol="0" anchor="ctr"/>
+          <a:lstStyle/>
+          <a:p>
+            <a:pPr algn="ctr"/>
             <a:endParaRPr lang="pt-BR"/>
+          </a:p>
+        </p:txBody>
+      </p:sp>
+      <p:sp>
+        <p:nvSpPr>
+          <p:cNvPr id="5" name="Elipse 4"/>
+          <p:cNvSpPr/>
+          <p:nvPr/>
+        </p:nvSpPr>
+        <p:spPr>
+          <a:xfrm>
+            <a:off x="642910" y="1714488"/>
+            <a:ext cx="785818" cy="642942"/>
+          </a:xfrm>
+          <a:prstGeom prst="ellipse">
+            <a:avLst/>
+          </a:prstGeom>
+        </p:spPr>
+        <p:style>
+          <a:lnRef idx="2">
+            <a:schemeClr val="accent1">
+              <a:shade val="50000"/>
+            </a:schemeClr>
+          </a:lnRef>
+          <a:fillRef idx="1">
+            <a:schemeClr val="accent1"/>
+          </a:fillRef>
+          <a:effectRef idx="0">
+            <a:schemeClr val="accent1"/>
+          </a:effectRef>
+          <a:fontRef idx="minor">
+            <a:schemeClr val="lt1"/>
+          </a:fontRef>
+        </p:style>
+        <p:txBody>
+          <a:bodyPr rtlCol="0" anchor="ctr"/>
+          <a:lstStyle/>
+          <a:p>
+            <a:pPr algn="ctr"/>
+            <a:r>
+              <a:rPr lang="pt-BR" sz="1000" b="1" dirty="0" err="1">
+                <a:solidFill>
+                  <a:schemeClr val="lt1"/>
+                </a:solidFill>
+              </a:rPr>
+              <a:t>img</a:t>
+            </a:r>
+            <a:endParaRPr lang="pt-BR" sz="1000" b="1" dirty="0">
+              <a:solidFill>
+                <a:schemeClr val="lt1"/>
+              </a:solidFill>
+            </a:endParaRPr>
+          </a:p>
+        </p:txBody>
+      </p:sp>
+      <p:sp>
+        <p:nvSpPr>
+          <p:cNvPr id="6" name="Retângulo 5"/>
+          <p:cNvSpPr/>
+          <p:nvPr/>
+        </p:nvSpPr>
+        <p:spPr>
+          <a:xfrm>
+            <a:off x="3571868" y="1857364"/>
+            <a:ext cx="4071966" cy="500066"/>
+          </a:xfrm>
+          <a:prstGeom prst="rect">
+            <a:avLst/>
+          </a:prstGeom>
+        </p:spPr>
+        <p:style>
+          <a:lnRef idx="2">
+            <a:schemeClr val="accent1">
+              <a:shade val="50000"/>
+            </a:schemeClr>
+          </a:lnRef>
+          <a:fillRef idx="1">
+            <a:schemeClr val="accent1"/>
+          </a:fillRef>
+          <a:effectRef idx="0">
+            <a:schemeClr val="accent1"/>
+          </a:effectRef>
+          <a:fontRef idx="minor">
+            <a:schemeClr val="lt1"/>
+          </a:fontRef>
+        </p:style>
+        <p:txBody>
+          <a:bodyPr rtlCol="0" anchor="ctr"/>
+          <a:lstStyle/>
+          <a:p>
+            <a:pPr algn="ctr"/>
+            <a:endParaRPr lang="pt-BR"/>
+          </a:p>
+        </p:txBody>
+      </p:sp>
+      <p:sp>
+        <p:nvSpPr>
+          <p:cNvPr id="7" name="Retângulo 6"/>
+          <p:cNvSpPr/>
+          <p:nvPr/>
+        </p:nvSpPr>
+        <p:spPr>
+          <a:xfrm>
+            <a:off x="428596" y="2500306"/>
+            <a:ext cx="2214578" cy="3500462"/>
+          </a:xfrm>
+          <a:prstGeom prst="rect">
+            <a:avLst/>
+          </a:prstGeom>
+        </p:spPr>
+        <p:style>
+          <a:lnRef idx="2">
+            <a:schemeClr val="accent1">
+              <a:shade val="50000"/>
+            </a:schemeClr>
+          </a:lnRef>
+          <a:fillRef idx="1">
+            <a:schemeClr val="accent1"/>
+          </a:fillRef>
+          <a:effectRef idx="0">
+            <a:schemeClr val="accent1"/>
+          </a:effectRef>
+          <a:fontRef idx="minor">
+            <a:schemeClr val="lt1"/>
+          </a:fontRef>
+        </p:style>
+        <p:txBody>
+          <a:bodyPr rtlCol="0" anchor="ctr"/>
+          <a:lstStyle/>
+          <a:p>
+            <a:pPr algn="ctr"/>
+            <a:endParaRPr lang="pt-BR"/>
+          </a:p>
+        </p:txBody>
+      </p:sp>
+      <p:sp>
+        <p:nvSpPr>
+          <p:cNvPr id="8" name="Retângulo 7"/>
+          <p:cNvSpPr/>
+          <p:nvPr/>
+        </p:nvSpPr>
+        <p:spPr>
+          <a:xfrm>
+            <a:off x="785786" y="2571744"/>
+            <a:ext cx="1500198" cy="1285884"/>
+          </a:xfrm>
+          <a:prstGeom prst="rect">
+            <a:avLst/>
+          </a:prstGeom>
+        </p:spPr>
+        <p:style>
+          <a:lnRef idx="2">
+            <a:schemeClr val="accent1">
+              <a:shade val="50000"/>
+            </a:schemeClr>
+          </a:lnRef>
+          <a:fillRef idx="1">
+            <a:schemeClr val="accent1"/>
+          </a:fillRef>
+          <a:effectRef idx="0">
+            <a:schemeClr val="accent1"/>
+          </a:effectRef>
+          <a:fontRef idx="minor">
+            <a:schemeClr val="lt1"/>
+          </a:fontRef>
+        </p:style>
+        <p:txBody>
+          <a:bodyPr rtlCol="0" anchor="ctr"/>
+          <a:lstStyle/>
+          <a:p>
+            <a:pPr algn="ctr"/>
+            <a:r>
+              <a:rPr lang="pt-BR" dirty="0" err="1" smtClean="0"/>
+              <a:t>img</a:t>
+            </a:r>
+            <a:endParaRPr lang="pt-BR" dirty="0"/>
+          </a:p>
+        </p:txBody>
+      </p:sp>
+      <p:sp>
+        <p:nvSpPr>
+          <p:cNvPr id="9" name="Retângulo 8"/>
+          <p:cNvSpPr/>
+          <p:nvPr/>
+        </p:nvSpPr>
+        <p:spPr>
+          <a:xfrm>
+            <a:off x="571472" y="3929066"/>
+            <a:ext cx="2000264" cy="2000264"/>
+          </a:xfrm>
+          <a:prstGeom prst="rect">
+            <a:avLst/>
+          </a:prstGeom>
+        </p:spPr>
+        <p:style>
+          <a:lnRef idx="2">
+            <a:schemeClr val="accent1">
+              <a:shade val="50000"/>
+            </a:schemeClr>
+          </a:lnRef>
+          <a:fillRef idx="1">
+            <a:schemeClr val="accent1"/>
+          </a:fillRef>
+          <a:effectRef idx="0">
+            <a:schemeClr val="accent1"/>
+          </a:effectRef>
+          <a:fontRef idx="minor">
+            <a:schemeClr val="lt1"/>
+          </a:fontRef>
+        </p:style>
+        <p:txBody>
+          <a:bodyPr rtlCol="0" anchor="ctr"/>
+          <a:lstStyle/>
+          <a:p>
+            <a:pPr algn="ctr"/>
+            <a:r>
+              <a:rPr lang="pt-BR" dirty="0" smtClean="0"/>
+              <a:t>parágrafo</a:t>
+            </a:r>
+            <a:endParaRPr lang="pt-BR" dirty="0"/>
+          </a:p>
+        </p:txBody>
+      </p:sp>
+      <p:grpSp>
+        <p:nvGrpSpPr>
+          <p:cNvPr id="12" name="Grupo 11"/>
+          <p:cNvGrpSpPr/>
+          <p:nvPr/>
+        </p:nvGrpSpPr>
+        <p:grpSpPr>
+          <a:xfrm>
+            <a:off x="3071802" y="2714620"/>
+            <a:ext cx="1000132" cy="1285884"/>
+            <a:chOff x="3071802" y="2714620"/>
+            <a:chExt cx="1000132" cy="1285884"/>
+          </a:xfrm>
+        </p:grpSpPr>
+        <p:sp>
+          <p:nvSpPr>
+            <p:cNvPr id="10" name="Retângulo 9"/>
+            <p:cNvSpPr/>
+            <p:nvPr/>
+          </p:nvSpPr>
+          <p:spPr>
+            <a:xfrm>
+              <a:off x="3071802" y="2714620"/>
+              <a:ext cx="1000132" cy="1000132"/>
+            </a:xfrm>
+            <a:prstGeom prst="rect">
+              <a:avLst/>
+            </a:prstGeom>
+          </p:spPr>
+          <p:style>
+            <a:lnRef idx="2">
+              <a:schemeClr val="accent1">
+                <a:shade val="50000"/>
+              </a:schemeClr>
+            </a:lnRef>
+            <a:fillRef idx="1">
+              <a:schemeClr val="accent1"/>
+            </a:fillRef>
+            <a:effectRef idx="0">
+              <a:schemeClr val="accent1"/>
+            </a:effectRef>
+            <a:fontRef idx="minor">
+              <a:schemeClr val="lt1"/>
+            </a:fontRef>
+          </p:style>
+          <p:txBody>
+            <a:bodyPr rtlCol="0" anchor="ctr"/>
+            <a:lstStyle/>
+            <a:p>
+              <a:pPr algn="ctr"/>
+              <a:r>
+                <a:rPr lang="pt-BR" dirty="0" err="1" smtClean="0"/>
+                <a:t>img</a:t>
+              </a:r>
+              <a:endParaRPr lang="pt-BR" dirty="0"/>
+            </a:p>
+          </p:txBody>
+        </p:sp>
+        <p:sp>
+          <p:nvSpPr>
+            <p:cNvPr id="11" name="Retângulo 10"/>
+            <p:cNvSpPr/>
+            <p:nvPr/>
+          </p:nvSpPr>
+          <p:spPr>
+            <a:xfrm>
+              <a:off x="3071802" y="3786190"/>
+              <a:ext cx="1000132" cy="214314"/>
+            </a:xfrm>
+            <a:prstGeom prst="rect">
+              <a:avLst/>
+            </a:prstGeom>
+          </p:spPr>
+          <p:style>
+            <a:lnRef idx="2">
+              <a:schemeClr val="accent1">
+                <a:shade val="50000"/>
+              </a:schemeClr>
+            </a:lnRef>
+            <a:fillRef idx="1">
+              <a:schemeClr val="accent1"/>
+            </a:fillRef>
+            <a:effectRef idx="0">
+              <a:schemeClr val="accent1"/>
+            </a:effectRef>
+            <a:fontRef idx="minor">
+              <a:schemeClr val="lt1"/>
+            </a:fontRef>
+          </p:style>
+          <p:txBody>
+            <a:bodyPr rtlCol="0" anchor="ctr"/>
+            <a:lstStyle/>
+            <a:p>
+              <a:pPr algn="ctr"/>
+              <a:r>
+                <a:rPr lang="pt-BR" sz="1200" dirty="0" smtClean="0"/>
+                <a:t>parágrafo</a:t>
+              </a:r>
+              <a:endParaRPr lang="pt-BR" sz="1200" dirty="0"/>
+            </a:p>
+          </p:txBody>
+        </p:sp>
+      </p:grpSp>
+      <p:grpSp>
+        <p:nvGrpSpPr>
+          <p:cNvPr id="13" name="Grupo 12"/>
+          <p:cNvGrpSpPr/>
+          <p:nvPr/>
+        </p:nvGrpSpPr>
+        <p:grpSpPr>
+          <a:xfrm>
+            <a:off x="4643438" y="2714620"/>
+            <a:ext cx="1000132" cy="1285884"/>
+            <a:chOff x="3071802" y="2714620"/>
+            <a:chExt cx="1000132" cy="1285884"/>
+          </a:xfrm>
+        </p:grpSpPr>
+        <p:sp>
+          <p:nvSpPr>
+            <p:cNvPr id="14" name="Retângulo 13"/>
+            <p:cNvSpPr/>
+            <p:nvPr/>
+          </p:nvSpPr>
+          <p:spPr>
+            <a:xfrm>
+              <a:off x="3071802" y="2714620"/>
+              <a:ext cx="1000132" cy="1000132"/>
+            </a:xfrm>
+            <a:prstGeom prst="rect">
+              <a:avLst/>
+            </a:prstGeom>
+          </p:spPr>
+          <p:style>
+            <a:lnRef idx="2">
+              <a:schemeClr val="accent1">
+                <a:shade val="50000"/>
+              </a:schemeClr>
+            </a:lnRef>
+            <a:fillRef idx="1">
+              <a:schemeClr val="accent1"/>
+            </a:fillRef>
+            <a:effectRef idx="0">
+              <a:schemeClr val="accent1"/>
+            </a:effectRef>
+            <a:fontRef idx="minor">
+              <a:schemeClr val="lt1"/>
+            </a:fontRef>
+          </p:style>
+          <p:txBody>
+            <a:bodyPr rtlCol="0" anchor="ctr"/>
+            <a:lstStyle/>
+            <a:p>
+              <a:pPr algn="ctr"/>
+              <a:r>
+                <a:rPr lang="pt-BR" dirty="0" err="1" smtClean="0"/>
+                <a:t>img</a:t>
+              </a:r>
+              <a:endParaRPr lang="pt-BR" dirty="0"/>
+            </a:p>
+          </p:txBody>
+        </p:sp>
+        <p:sp>
+          <p:nvSpPr>
+            <p:cNvPr id="15" name="Retângulo 14"/>
+            <p:cNvSpPr/>
+            <p:nvPr/>
+          </p:nvSpPr>
+          <p:spPr>
+            <a:xfrm>
+              <a:off x="3071802" y="3786190"/>
+              <a:ext cx="1000132" cy="214314"/>
+            </a:xfrm>
+            <a:prstGeom prst="rect">
+              <a:avLst/>
+            </a:prstGeom>
+          </p:spPr>
+          <p:style>
+            <a:lnRef idx="2">
+              <a:schemeClr val="accent1">
+                <a:shade val="50000"/>
+              </a:schemeClr>
+            </a:lnRef>
+            <a:fillRef idx="1">
+              <a:schemeClr val="accent1"/>
+            </a:fillRef>
+            <a:effectRef idx="0">
+              <a:schemeClr val="accent1"/>
+            </a:effectRef>
+            <a:fontRef idx="minor">
+              <a:schemeClr val="lt1"/>
+            </a:fontRef>
+          </p:style>
+          <p:txBody>
+            <a:bodyPr rtlCol="0" anchor="ctr"/>
+            <a:lstStyle/>
+            <a:p>
+              <a:pPr algn="ctr"/>
+              <a:r>
+                <a:rPr lang="pt-BR" sz="1200" dirty="0" smtClean="0"/>
+                <a:t>parágrafo</a:t>
+              </a:r>
+              <a:endParaRPr lang="pt-BR" sz="1200" dirty="0"/>
+            </a:p>
+          </p:txBody>
+        </p:sp>
+      </p:grpSp>
+      <p:grpSp>
+        <p:nvGrpSpPr>
+          <p:cNvPr id="19" name="Grupo 18"/>
+          <p:cNvGrpSpPr/>
+          <p:nvPr/>
+        </p:nvGrpSpPr>
+        <p:grpSpPr>
+          <a:xfrm>
+            <a:off x="6072198" y="2714620"/>
+            <a:ext cx="1000132" cy="1285884"/>
+            <a:chOff x="3071802" y="2714620"/>
+            <a:chExt cx="1000132" cy="1285884"/>
+          </a:xfrm>
+        </p:grpSpPr>
+        <p:sp>
+          <p:nvSpPr>
+            <p:cNvPr id="20" name="Retângulo 19"/>
+            <p:cNvSpPr/>
+            <p:nvPr/>
+          </p:nvSpPr>
+          <p:spPr>
+            <a:xfrm>
+              <a:off x="3071802" y="2714620"/>
+              <a:ext cx="1000132" cy="1000132"/>
+            </a:xfrm>
+            <a:prstGeom prst="rect">
+              <a:avLst/>
+            </a:prstGeom>
+          </p:spPr>
+          <p:style>
+            <a:lnRef idx="2">
+              <a:schemeClr val="accent1">
+                <a:shade val="50000"/>
+              </a:schemeClr>
+            </a:lnRef>
+            <a:fillRef idx="1">
+              <a:schemeClr val="accent1"/>
+            </a:fillRef>
+            <a:effectRef idx="0">
+              <a:schemeClr val="accent1"/>
+            </a:effectRef>
+            <a:fontRef idx="minor">
+              <a:schemeClr val="lt1"/>
+            </a:fontRef>
+          </p:style>
+          <p:txBody>
+            <a:bodyPr rtlCol="0" anchor="ctr"/>
+            <a:lstStyle/>
+            <a:p>
+              <a:pPr algn="ctr"/>
+              <a:r>
+                <a:rPr lang="pt-BR" dirty="0" err="1" smtClean="0"/>
+                <a:t>img</a:t>
+              </a:r>
+              <a:endParaRPr lang="pt-BR" dirty="0"/>
+            </a:p>
+          </p:txBody>
+        </p:sp>
+        <p:sp>
+          <p:nvSpPr>
+            <p:cNvPr id="21" name="Retângulo 20"/>
+            <p:cNvSpPr/>
+            <p:nvPr/>
+          </p:nvSpPr>
+          <p:spPr>
+            <a:xfrm>
+              <a:off x="3071802" y="3786190"/>
+              <a:ext cx="1000132" cy="214314"/>
+            </a:xfrm>
+            <a:prstGeom prst="rect">
+              <a:avLst/>
+            </a:prstGeom>
+          </p:spPr>
+          <p:style>
+            <a:lnRef idx="2">
+              <a:schemeClr val="accent1">
+                <a:shade val="50000"/>
+              </a:schemeClr>
+            </a:lnRef>
+            <a:fillRef idx="1">
+              <a:schemeClr val="accent1"/>
+            </a:fillRef>
+            <a:effectRef idx="0">
+              <a:schemeClr val="accent1"/>
+            </a:effectRef>
+            <a:fontRef idx="minor">
+              <a:schemeClr val="lt1"/>
+            </a:fontRef>
+          </p:style>
+          <p:txBody>
+            <a:bodyPr rtlCol="0" anchor="ctr"/>
+            <a:lstStyle/>
+            <a:p>
+              <a:pPr algn="ctr"/>
+              <a:r>
+                <a:rPr lang="pt-BR" sz="1200" dirty="0" smtClean="0"/>
+                <a:t>parágrafo</a:t>
+              </a:r>
+              <a:endParaRPr lang="pt-BR" sz="1200" dirty="0"/>
+            </a:p>
+          </p:txBody>
+        </p:sp>
+      </p:grpSp>
+      <p:grpSp>
+        <p:nvGrpSpPr>
+          <p:cNvPr id="22" name="Grupo 21"/>
+          <p:cNvGrpSpPr/>
+          <p:nvPr/>
+        </p:nvGrpSpPr>
+        <p:grpSpPr>
+          <a:xfrm>
+            <a:off x="3071802" y="4143380"/>
+            <a:ext cx="1000132" cy="1285884"/>
+            <a:chOff x="3071802" y="2714620"/>
+            <a:chExt cx="1000132" cy="1285884"/>
+          </a:xfrm>
+        </p:grpSpPr>
+        <p:sp>
+          <p:nvSpPr>
+            <p:cNvPr id="23" name="Retângulo 22"/>
+            <p:cNvSpPr/>
+            <p:nvPr/>
+          </p:nvSpPr>
+          <p:spPr>
+            <a:xfrm>
+              <a:off x="3071802" y="2714620"/>
+              <a:ext cx="1000132" cy="1000132"/>
+            </a:xfrm>
+            <a:prstGeom prst="rect">
+              <a:avLst/>
+            </a:prstGeom>
+          </p:spPr>
+          <p:style>
+            <a:lnRef idx="2">
+              <a:schemeClr val="accent1">
+                <a:shade val="50000"/>
+              </a:schemeClr>
+            </a:lnRef>
+            <a:fillRef idx="1">
+              <a:schemeClr val="accent1"/>
+            </a:fillRef>
+            <a:effectRef idx="0">
+              <a:schemeClr val="accent1"/>
+            </a:effectRef>
+            <a:fontRef idx="minor">
+              <a:schemeClr val="lt1"/>
+            </a:fontRef>
+          </p:style>
+          <p:txBody>
+            <a:bodyPr rtlCol="0" anchor="ctr"/>
+            <a:lstStyle/>
+            <a:p>
+              <a:pPr algn="ctr"/>
+              <a:r>
+                <a:rPr lang="pt-BR" dirty="0" err="1" smtClean="0"/>
+                <a:t>img</a:t>
+              </a:r>
+              <a:endParaRPr lang="pt-BR" dirty="0"/>
+            </a:p>
+          </p:txBody>
+        </p:sp>
+        <p:sp>
+          <p:nvSpPr>
+            <p:cNvPr id="24" name="Retângulo 23"/>
+            <p:cNvSpPr/>
+            <p:nvPr/>
+          </p:nvSpPr>
+          <p:spPr>
+            <a:xfrm>
+              <a:off x="3071802" y="3786190"/>
+              <a:ext cx="1000132" cy="214314"/>
+            </a:xfrm>
+            <a:prstGeom prst="rect">
+              <a:avLst/>
+            </a:prstGeom>
+          </p:spPr>
+          <p:style>
+            <a:lnRef idx="2">
+              <a:schemeClr val="accent1">
+                <a:shade val="50000"/>
+              </a:schemeClr>
+            </a:lnRef>
+            <a:fillRef idx="1">
+              <a:schemeClr val="accent1"/>
+            </a:fillRef>
+            <a:effectRef idx="0">
+              <a:schemeClr val="accent1"/>
+            </a:effectRef>
+            <a:fontRef idx="minor">
+              <a:schemeClr val="lt1"/>
+            </a:fontRef>
+          </p:style>
+          <p:txBody>
+            <a:bodyPr rtlCol="0" anchor="ctr"/>
+            <a:lstStyle/>
+            <a:p>
+              <a:pPr algn="ctr"/>
+              <a:r>
+                <a:rPr lang="pt-BR" sz="1200" dirty="0" smtClean="0"/>
+                <a:t>parágrafo</a:t>
+              </a:r>
+              <a:endParaRPr lang="pt-BR" sz="1200" dirty="0"/>
+            </a:p>
+          </p:txBody>
+        </p:sp>
+      </p:grpSp>
+      <p:grpSp>
+        <p:nvGrpSpPr>
+          <p:cNvPr id="25" name="Grupo 24"/>
+          <p:cNvGrpSpPr/>
+          <p:nvPr/>
+        </p:nvGrpSpPr>
+        <p:grpSpPr>
+          <a:xfrm>
+            <a:off x="4643438" y="4143380"/>
+            <a:ext cx="1000132" cy="1285884"/>
+            <a:chOff x="3071802" y="2714620"/>
+            <a:chExt cx="1000132" cy="1285884"/>
+          </a:xfrm>
+        </p:grpSpPr>
+        <p:sp>
+          <p:nvSpPr>
+            <p:cNvPr id="26" name="Retângulo 25"/>
+            <p:cNvSpPr/>
+            <p:nvPr/>
+          </p:nvSpPr>
+          <p:spPr>
+            <a:xfrm>
+              <a:off x="3071802" y="2714620"/>
+              <a:ext cx="1000132" cy="1000132"/>
+            </a:xfrm>
+            <a:prstGeom prst="rect">
+              <a:avLst/>
+            </a:prstGeom>
+          </p:spPr>
+          <p:style>
+            <a:lnRef idx="2">
+              <a:schemeClr val="accent1">
+                <a:shade val="50000"/>
+              </a:schemeClr>
+            </a:lnRef>
+            <a:fillRef idx="1">
+              <a:schemeClr val="accent1"/>
+            </a:fillRef>
+            <a:effectRef idx="0">
+              <a:schemeClr val="accent1"/>
+            </a:effectRef>
+            <a:fontRef idx="minor">
+              <a:schemeClr val="lt1"/>
+            </a:fontRef>
+          </p:style>
+          <p:txBody>
+            <a:bodyPr rtlCol="0" anchor="ctr"/>
+            <a:lstStyle/>
+            <a:p>
+              <a:pPr algn="ctr"/>
+              <a:r>
+                <a:rPr lang="pt-BR" dirty="0" err="1" smtClean="0"/>
+                <a:t>img</a:t>
+              </a:r>
+              <a:endParaRPr lang="pt-BR" dirty="0"/>
+            </a:p>
+          </p:txBody>
+        </p:sp>
+        <p:sp>
+          <p:nvSpPr>
+            <p:cNvPr id="27" name="Retângulo 26"/>
+            <p:cNvSpPr/>
+            <p:nvPr/>
+          </p:nvSpPr>
+          <p:spPr>
+            <a:xfrm>
+              <a:off x="3071802" y="3786190"/>
+              <a:ext cx="1000132" cy="214314"/>
+            </a:xfrm>
+            <a:prstGeom prst="rect">
+              <a:avLst/>
+            </a:prstGeom>
+          </p:spPr>
+          <p:style>
+            <a:lnRef idx="2">
+              <a:schemeClr val="accent1">
+                <a:shade val="50000"/>
+              </a:schemeClr>
+            </a:lnRef>
+            <a:fillRef idx="1">
+              <a:schemeClr val="accent1"/>
+            </a:fillRef>
+            <a:effectRef idx="0">
+              <a:schemeClr val="accent1"/>
+            </a:effectRef>
+            <a:fontRef idx="minor">
+              <a:schemeClr val="lt1"/>
+            </a:fontRef>
+          </p:style>
+          <p:txBody>
+            <a:bodyPr rtlCol="0" anchor="ctr"/>
+            <a:lstStyle/>
+            <a:p>
+              <a:pPr algn="ctr"/>
+              <a:r>
+                <a:rPr lang="pt-BR" sz="1200" dirty="0" smtClean="0"/>
+                <a:t>parágrafo</a:t>
+              </a:r>
+              <a:endParaRPr lang="pt-BR" sz="1200" dirty="0"/>
+            </a:p>
+          </p:txBody>
+        </p:sp>
+      </p:grpSp>
+      <p:grpSp>
+        <p:nvGrpSpPr>
+          <p:cNvPr id="28" name="Grupo 27"/>
+          <p:cNvGrpSpPr/>
+          <p:nvPr/>
+        </p:nvGrpSpPr>
+        <p:grpSpPr>
+          <a:xfrm>
+            <a:off x="6072198" y="4143380"/>
+            <a:ext cx="1000132" cy="1285884"/>
+            <a:chOff x="3071802" y="2714620"/>
+            <a:chExt cx="1000132" cy="1285884"/>
+          </a:xfrm>
+        </p:grpSpPr>
+        <p:sp>
+          <p:nvSpPr>
+            <p:cNvPr id="29" name="Retângulo 28"/>
+            <p:cNvSpPr/>
+            <p:nvPr/>
+          </p:nvSpPr>
+          <p:spPr>
+            <a:xfrm>
+              <a:off x="3071802" y="2714620"/>
+              <a:ext cx="1000132" cy="1000132"/>
+            </a:xfrm>
+            <a:prstGeom prst="rect">
+              <a:avLst/>
+            </a:prstGeom>
+          </p:spPr>
+          <p:style>
+            <a:lnRef idx="2">
+              <a:schemeClr val="accent1">
+                <a:shade val="50000"/>
+              </a:schemeClr>
+            </a:lnRef>
+            <a:fillRef idx="1">
+              <a:schemeClr val="accent1"/>
+            </a:fillRef>
+            <a:effectRef idx="0">
+              <a:schemeClr val="accent1"/>
+            </a:effectRef>
+            <a:fontRef idx="minor">
+              <a:schemeClr val="lt1"/>
+            </a:fontRef>
+          </p:style>
+          <p:txBody>
+            <a:bodyPr rtlCol="0" anchor="ctr"/>
+            <a:lstStyle/>
+            <a:p>
+              <a:pPr algn="ctr"/>
+              <a:r>
+                <a:rPr lang="pt-BR" dirty="0" err="1" smtClean="0"/>
+                <a:t>img</a:t>
+              </a:r>
+              <a:endParaRPr lang="pt-BR" dirty="0"/>
+            </a:p>
+          </p:txBody>
+        </p:sp>
+        <p:sp>
+          <p:nvSpPr>
+            <p:cNvPr id="30" name="Retângulo 29"/>
+            <p:cNvSpPr/>
+            <p:nvPr/>
+          </p:nvSpPr>
+          <p:spPr>
+            <a:xfrm>
+              <a:off x="3071802" y="3786190"/>
+              <a:ext cx="1000132" cy="214314"/>
+            </a:xfrm>
+            <a:prstGeom prst="rect">
+              <a:avLst/>
+            </a:prstGeom>
+          </p:spPr>
+          <p:style>
+            <a:lnRef idx="2">
+              <a:schemeClr val="accent1">
+                <a:shade val="50000"/>
+              </a:schemeClr>
+            </a:lnRef>
+            <a:fillRef idx="1">
+              <a:schemeClr val="accent1"/>
+            </a:fillRef>
+            <a:effectRef idx="0">
+              <a:schemeClr val="accent1"/>
+            </a:effectRef>
+            <a:fontRef idx="minor">
+              <a:schemeClr val="lt1"/>
+            </a:fontRef>
+          </p:style>
+          <p:txBody>
+            <a:bodyPr rtlCol="0" anchor="ctr"/>
+            <a:lstStyle/>
+            <a:p>
+              <a:pPr algn="ctr"/>
+              <a:r>
+                <a:rPr lang="pt-BR" sz="1200" dirty="0" smtClean="0"/>
+                <a:t>parágrafo</a:t>
+              </a:r>
+              <a:endParaRPr lang="pt-BR" sz="1200" dirty="0"/>
+            </a:p>
+          </p:txBody>
+        </p:sp>
+      </p:grpSp>
+      <p:sp>
+        <p:nvSpPr>
+          <p:cNvPr id="31" name="Retângulo 30"/>
+          <p:cNvSpPr/>
+          <p:nvPr/>
+        </p:nvSpPr>
+        <p:spPr>
+          <a:xfrm>
+            <a:off x="428596" y="6000768"/>
+            <a:ext cx="7286676" cy="428628"/>
+          </a:xfrm>
+          <a:prstGeom prst="rect">
+            <a:avLst/>
+          </a:prstGeom>
+        </p:spPr>
+        <p:style>
+          <a:lnRef idx="2">
+            <a:schemeClr val="accent1">
+              <a:shade val="50000"/>
+            </a:schemeClr>
+          </a:lnRef>
+          <a:fillRef idx="1">
+            <a:schemeClr val="accent1"/>
+          </a:fillRef>
+          <a:effectRef idx="0">
+            <a:schemeClr val="accent1"/>
+          </a:effectRef>
+          <a:fontRef idx="minor">
+            <a:schemeClr val="lt1"/>
+          </a:fontRef>
+        </p:style>
+        <p:txBody>
+          <a:bodyPr rtlCol="0" anchor="ctr"/>
+          <a:lstStyle/>
+          <a:p>
+            <a:pPr algn="ctr"/>
+            <a:r>
+              <a:rPr lang="pt-BR" dirty="0" err="1"/>
+              <a:t>f</a:t>
+            </a:r>
+            <a:r>
+              <a:rPr lang="pt-BR" dirty="0" err="1" smtClean="0"/>
+              <a:t>ooter</a:t>
+            </a:r>
+            <a:r>
+              <a:rPr lang="pt-BR" dirty="0" smtClean="0"/>
+              <a:t> com informação de contato e copyright </a:t>
+            </a:r>
+            <a:endParaRPr lang="pt-BR" dirty="0"/>
+          </a:p>
+        </p:txBody>
+      </p:sp>
+      <p:sp>
+        <p:nvSpPr>
+          <p:cNvPr id="33" name="Retângulo 32"/>
+          <p:cNvSpPr/>
+          <p:nvPr/>
+        </p:nvSpPr>
+        <p:spPr>
+          <a:xfrm>
+            <a:off x="2786050" y="5572140"/>
+            <a:ext cx="4857784" cy="357190"/>
+          </a:xfrm>
+          <a:prstGeom prst="rect">
+            <a:avLst/>
+          </a:prstGeom>
+        </p:spPr>
+        <p:style>
+          <a:lnRef idx="2">
+            <a:schemeClr val="accent1">
+              <a:shade val="50000"/>
+            </a:schemeClr>
+          </a:lnRef>
+          <a:fillRef idx="1">
+            <a:schemeClr val="accent1"/>
+          </a:fillRef>
+          <a:effectRef idx="0">
+            <a:schemeClr val="accent1"/>
+          </a:effectRef>
+          <a:fontRef idx="minor">
+            <a:schemeClr val="lt1"/>
+          </a:fontRef>
+        </p:style>
+        <p:txBody>
+          <a:bodyPr rtlCol="0" anchor="ctr"/>
+          <a:lstStyle/>
+          <a:p>
+            <a:pPr algn="ctr"/>
+            <a:r>
+              <a:rPr lang="pt-BR" dirty="0" smtClean="0"/>
+              <a:t>Citação favorita</a:t>
+            </a:r>
+          </a:p>
+        </p:txBody>
+      </p:sp>
+      <p:sp>
+        <p:nvSpPr>
+          <p:cNvPr id="34" name="Retângulo 33"/>
+          <p:cNvSpPr/>
+          <p:nvPr/>
+        </p:nvSpPr>
+        <p:spPr>
+          <a:xfrm>
+            <a:off x="3714744" y="2000240"/>
+            <a:ext cx="857256" cy="214314"/>
+          </a:xfrm>
+          <a:prstGeom prst="rect">
+            <a:avLst/>
+          </a:prstGeom>
+        </p:spPr>
+        <p:style>
+          <a:lnRef idx="2">
+            <a:schemeClr val="accent1">
+              <a:shade val="50000"/>
+            </a:schemeClr>
+          </a:lnRef>
+          <a:fillRef idx="1">
+            <a:schemeClr val="accent1"/>
+          </a:fillRef>
+          <a:effectRef idx="0">
+            <a:schemeClr val="accent1"/>
+          </a:effectRef>
+          <a:fontRef idx="minor">
+            <a:schemeClr val="lt1"/>
+          </a:fontRef>
+        </p:style>
+        <p:txBody>
+          <a:bodyPr rtlCol="0" anchor="ctr"/>
+          <a:lstStyle/>
+          <a:p>
+            <a:pPr algn="ctr"/>
+            <a:r>
+              <a:rPr lang="pt-BR" sz="1000" dirty="0" smtClean="0"/>
+              <a:t>Home</a:t>
+            </a:r>
+            <a:endParaRPr lang="pt-BR" sz="1000" dirty="0"/>
+          </a:p>
+        </p:txBody>
+      </p:sp>
+      <p:sp>
+        <p:nvSpPr>
+          <p:cNvPr id="35" name="Retângulo 34"/>
+          <p:cNvSpPr/>
+          <p:nvPr/>
+        </p:nvSpPr>
+        <p:spPr>
+          <a:xfrm>
+            <a:off x="4714876" y="2000240"/>
+            <a:ext cx="857256" cy="214314"/>
+          </a:xfrm>
+          <a:prstGeom prst="rect">
+            <a:avLst/>
+          </a:prstGeom>
+        </p:spPr>
+        <p:style>
+          <a:lnRef idx="2">
+            <a:schemeClr val="accent1">
+              <a:shade val="50000"/>
+            </a:schemeClr>
+          </a:lnRef>
+          <a:fillRef idx="1">
+            <a:schemeClr val="accent1"/>
+          </a:fillRef>
+          <a:effectRef idx="0">
+            <a:schemeClr val="accent1"/>
+          </a:effectRef>
+          <a:fontRef idx="minor">
+            <a:schemeClr val="lt1"/>
+          </a:fontRef>
+        </p:style>
+        <p:txBody>
+          <a:bodyPr rtlCol="0" anchor="ctr"/>
+          <a:lstStyle/>
+          <a:p>
+            <a:pPr algn="ctr"/>
+            <a:r>
+              <a:rPr lang="pt-BR" sz="1000" dirty="0" smtClean="0"/>
+              <a:t>Categorias</a:t>
+            </a:r>
+            <a:endParaRPr lang="pt-BR" sz="1000" dirty="0"/>
+          </a:p>
+        </p:txBody>
+      </p:sp>
+      <p:sp>
+        <p:nvSpPr>
+          <p:cNvPr id="36" name="Retângulo 35"/>
+          <p:cNvSpPr/>
+          <p:nvPr/>
+        </p:nvSpPr>
+        <p:spPr>
+          <a:xfrm>
+            <a:off x="5715008" y="2000240"/>
+            <a:ext cx="857256" cy="214314"/>
+          </a:xfrm>
+          <a:prstGeom prst="rect">
+            <a:avLst/>
+          </a:prstGeom>
+        </p:spPr>
+        <p:style>
+          <a:lnRef idx="2">
+            <a:schemeClr val="accent1">
+              <a:shade val="50000"/>
+            </a:schemeClr>
+          </a:lnRef>
+          <a:fillRef idx="1">
+            <a:schemeClr val="accent1"/>
+          </a:fillRef>
+          <a:effectRef idx="0">
+            <a:schemeClr val="accent1"/>
+          </a:effectRef>
+          <a:fontRef idx="minor">
+            <a:schemeClr val="lt1"/>
+          </a:fontRef>
+        </p:style>
+        <p:txBody>
+          <a:bodyPr rtlCol="0" anchor="ctr"/>
+          <a:lstStyle/>
+          <a:p>
+            <a:pPr algn="ctr"/>
+            <a:r>
+              <a:rPr lang="pt-BR" sz="1000" dirty="0" smtClean="0"/>
+              <a:t>Anedotas</a:t>
+            </a:r>
+            <a:endParaRPr lang="pt-BR" sz="1000" dirty="0"/>
+          </a:p>
+        </p:txBody>
+      </p:sp>
+      <p:sp>
+        <p:nvSpPr>
+          <p:cNvPr id="37" name="Retângulo 36"/>
+          <p:cNvSpPr/>
+          <p:nvPr/>
+        </p:nvSpPr>
+        <p:spPr>
+          <a:xfrm>
+            <a:off x="6715140" y="2000240"/>
+            <a:ext cx="857256" cy="214314"/>
+          </a:xfrm>
+          <a:prstGeom prst="rect">
+            <a:avLst/>
+          </a:prstGeom>
+        </p:spPr>
+        <p:style>
+          <a:lnRef idx="2">
+            <a:schemeClr val="accent1">
+              <a:shade val="50000"/>
+            </a:schemeClr>
+          </a:lnRef>
+          <a:fillRef idx="1">
+            <a:schemeClr val="accent1"/>
+          </a:fillRef>
+          <a:effectRef idx="0">
+            <a:schemeClr val="accent1"/>
+          </a:effectRef>
+          <a:fontRef idx="minor">
+            <a:schemeClr val="lt1"/>
+          </a:fontRef>
+        </p:style>
+        <p:txBody>
+          <a:bodyPr rtlCol="0" anchor="ctr"/>
+          <a:lstStyle/>
+          <a:p>
+            <a:pPr algn="ctr"/>
+            <a:r>
+              <a:rPr lang="pt-BR" sz="1000" dirty="0" smtClean="0"/>
+              <a:t>Contato</a:t>
+            </a:r>
+            <a:endParaRPr lang="pt-BR" sz="1000" dirty="0"/>
           </a:p>
         </p:txBody>
       </p:sp>

</xml_diff>